<commit_message>
Minor updates to pptx template
</commit_message>
<xml_diff>
--- a/scripts/helper_files/Risk-Map-Slides-Template.pptx
+++ b/scripts/helper_files/Risk-Map-Slides-Template.pptx
@@ -898,7 +898,7 @@
             <a:fld id="{EA116FA8-12ED-4DB7-9E1C-8D8E5107CE88}" type="datetime8">
               <a:rPr lang="en-US" smtClean="0"/>
               <a:pPr/>
-              <a:t>12/24/2020 10:11 AM</a:t>
+              <a:t>12/24/2020 10:58 AM</a:t>
             </a:fld>
             <a:endParaRPr lang="en-US" dirty="0"/>
           </a:p>
@@ -1140,7 +1140,7 @@
             <a:fld id="{EA116FA8-12ED-4DB7-9E1C-8D8E5107CE88}" type="datetime8">
               <a:rPr lang="en-US" smtClean="0"/>
               <a:pPr/>
-              <a:t>12/24/2020 10:11 AM</a:t>
+              <a:t>12/24/2020 10:58 AM</a:t>
             </a:fld>
             <a:endParaRPr lang="en-US" dirty="0"/>
           </a:p>
@@ -1392,7 +1392,7 @@
             <a:fld id="{EA116FA8-12ED-4DB7-9E1C-8D8E5107CE88}" type="datetime8">
               <a:rPr lang="en-US" smtClean="0"/>
               <a:pPr/>
-              <a:t>12/24/2020 10:11 AM</a:t>
+              <a:t>12/24/2020 10:58 AM</a:t>
             </a:fld>
             <a:endParaRPr lang="en-US" dirty="0"/>
           </a:p>
@@ -1634,7 +1634,7 @@
             <a:fld id="{EA116FA8-12ED-4DB7-9E1C-8D8E5107CE88}" type="datetime8">
               <a:rPr lang="en-US" smtClean="0"/>
               <a:pPr/>
-              <a:t>12/24/2020 10:11 AM</a:t>
+              <a:t>12/24/2020 10:58 AM</a:t>
             </a:fld>
             <a:endParaRPr lang="en-US" dirty="0"/>
           </a:p>
@@ -1953,7 +1953,7 @@
             <a:fld id="{EA116FA8-12ED-4DB7-9E1C-8D8E5107CE88}" type="datetime8">
               <a:rPr lang="en-US" smtClean="0"/>
               <a:pPr/>
-              <a:t>12/24/2020 10:11 AM</a:t>
+              <a:t>12/24/2020 10:58 AM</a:t>
             </a:fld>
             <a:endParaRPr lang="en-US" dirty="0"/>
           </a:p>
@@ -2262,7 +2262,7 @@
             <a:fld id="{EA116FA8-12ED-4DB7-9E1C-8D8E5107CE88}" type="datetime8">
               <a:rPr lang="en-US" smtClean="0"/>
               <a:pPr/>
-              <a:t>12/24/2020 10:11 AM</a:t>
+              <a:t>12/24/2020 10:58 AM</a:t>
             </a:fld>
             <a:endParaRPr lang="en-US" dirty="0"/>
           </a:p>
@@ -2718,7 +2718,7 @@
             <a:fld id="{EA116FA8-12ED-4DB7-9E1C-8D8E5107CE88}" type="datetime8">
               <a:rPr lang="en-US" smtClean="0"/>
               <a:pPr/>
-              <a:t>12/24/2020 10:11 AM</a:t>
+              <a:t>12/24/2020 10:58 AM</a:t>
             </a:fld>
             <a:endParaRPr lang="en-US" dirty="0"/>
           </a:p>
@@ -2903,7 +2903,7 @@
             <a:fld id="{EA116FA8-12ED-4DB7-9E1C-8D8E5107CE88}" type="datetime8">
               <a:rPr lang="en-US" smtClean="0"/>
               <a:pPr/>
-              <a:t>12/24/2020 10:11 AM</a:t>
+              <a:t>12/24/2020 10:58 AM</a:t>
             </a:fld>
             <a:endParaRPr lang="en-US" dirty="0"/>
           </a:p>
@@ -3060,7 +3060,7 @@
             <a:fld id="{EA116FA8-12ED-4DB7-9E1C-8D8E5107CE88}" type="datetime8">
               <a:rPr lang="en-US" smtClean="0"/>
               <a:pPr/>
-              <a:t>12/24/2020 10:11 AM</a:t>
+              <a:t>12/24/2020 10:58 AM</a:t>
             </a:fld>
             <a:endParaRPr lang="en-US" dirty="0"/>
           </a:p>
@@ -3362,7 +3362,7 @@
             <a:fld id="{EA116FA8-12ED-4DB7-9E1C-8D8E5107CE88}" type="datetime8">
               <a:rPr lang="en-US" smtClean="0"/>
               <a:pPr/>
-              <a:t>12/24/2020 10:11 AM</a:t>
+              <a:t>12/24/2020 10:58 AM</a:t>
             </a:fld>
             <a:endParaRPr lang="en-US" dirty="0"/>
           </a:p>
@@ -3610,7 +3610,7 @@
             <a:fld id="{EA116FA8-12ED-4DB7-9E1C-8D8E5107CE88}" type="datetime8">
               <a:rPr lang="en-US" smtClean="0"/>
               <a:pPr/>
-              <a:t>12/24/2020 10:11 AM</a:t>
+              <a:t>12/24/2020 10:58 AM</a:t>
             </a:fld>
             <a:endParaRPr lang="en-US" dirty="0"/>
           </a:p>
@@ -3871,8 +3871,8 @@
         </p:blipFill>
         <p:spPr bwMode="auto">
           <a:xfrm>
-            <a:off x="141316" y="5608755"/>
-            <a:ext cx="1393768" cy="1112720"/>
+            <a:off x="249382" y="6197759"/>
+            <a:ext cx="687214" cy="548640"/>
           </a:xfrm>
           <a:prstGeom prst="rect">
             <a:avLst/>
@@ -3910,7 +3910,7 @@
         </p:nvSpPr>
         <p:spPr>
           <a:xfrm>
-            <a:off x="1375719" y="6334125"/>
+            <a:off x="936596" y="6287413"/>
             <a:ext cx="4871847" cy="369332"/>
           </a:xfrm>
           <a:prstGeom prst="rect">
@@ -3936,6 +3936,86 @@
                 <a:cs typeface="Courier New" panose="02070309020205020404" pitchFamily="49" charset="0"/>
               </a:rPr>
               <a:t>www.centerforcyberintelligence.org</a:t>
+            </a:r>
+          </a:p>
+        </p:txBody>
+      </p:sp>
+      <p:pic>
+        <p:nvPicPr>
+          <p:cNvPr id="7" name="Picture 6" descr="Logo&#10;&#10;Description automatically generated">
+            <a:extLst>
+              <a:ext uri="{FF2B5EF4-FFF2-40B4-BE49-F238E27FC236}">
+                <a16:creationId xmlns:a16="http://schemas.microsoft.com/office/drawing/2014/main" id="{2FCA1256-7968-4FB3-A37D-6C53235B7557}"/>
+              </a:ext>
+            </a:extLst>
+          </p:cNvPr>
+          <p:cNvPicPr>
+            <a:picLocks noChangeAspect="1"/>
+          </p:cNvPicPr>
+          <p:nvPr userDrawn="1"/>
+        </p:nvPicPr>
+        <p:blipFill>
+          <a:blip r:embed="rId15">
+            <a:extLst>
+              <a:ext uri="{28A0092B-C50C-407E-A947-70E740481C1C}">
+                <a14:useLocalDpi xmlns:a14="http://schemas.microsoft.com/office/drawing/2010/main" val="0"/>
+              </a:ext>
+            </a:extLst>
+          </a:blip>
+          <a:stretch>
+            <a:fillRect/>
+          </a:stretch>
+        </p:blipFill>
+        <p:spPr>
+          <a:xfrm>
+            <a:off x="7487139" y="6197759"/>
+            <a:ext cx="548640" cy="548640"/>
+          </a:xfrm>
+          <a:prstGeom prst="rect">
+            <a:avLst/>
+          </a:prstGeom>
+        </p:spPr>
+      </p:pic>
+      <p:sp>
+        <p:nvSpPr>
+          <p:cNvPr id="12" name="TextBox 11">
+            <a:extLst>
+              <a:ext uri="{FF2B5EF4-FFF2-40B4-BE49-F238E27FC236}">
+                <a16:creationId xmlns:a16="http://schemas.microsoft.com/office/drawing/2014/main" id="{76421794-4DF5-449B-8EF8-2AF754B6ABF3}"/>
+              </a:ext>
+            </a:extLst>
+          </p:cNvPr>
+          <p:cNvSpPr txBox="1"/>
+          <p:nvPr userDrawn="1"/>
+        </p:nvSpPr>
+        <p:spPr>
+          <a:xfrm>
+            <a:off x="8035779" y="6287413"/>
+            <a:ext cx="3906839" cy="369332"/>
+          </a:xfrm>
+          <a:prstGeom prst="rect">
+            <a:avLst/>
+          </a:prstGeom>
+          <a:noFill/>
+        </p:spPr>
+        <p:txBody>
+          <a:bodyPr wrap="none" rtlCol="0">
+            <a:spAutoFit/>
+          </a:bodyPr>
+          <a:lstStyle/>
+          <a:p>
+            <a:r>
+              <a:rPr lang="en-US" dirty="0">
+                <a:solidFill>
+                  <a:schemeClr val="tx1">
+                    <a:lumMod val="50000"/>
+                    <a:lumOff val="50000"/>
+                  </a:schemeClr>
+                </a:solidFill>
+                <a:latin typeface="Courier New" panose="02070309020205020404" pitchFamily="49" charset="0"/>
+                <a:cs typeface="Courier New" panose="02070309020205020404" pitchFamily="49" charset="0"/>
+              </a:rPr>
+              <a:t>www.patreon.com/chriscooley</a:t>
             </a:r>
           </a:p>
         </p:txBody>

</xml_diff>

<commit_message>
Local and Cloud Storage of data assets and PowerPoint Files
Minor Revision: Update enables the local storage of collected historic and summary data from COVID Act Now. Other updates made to handling of PowerPoint files enabling storage both locally and on Google Drive.
</commit_message>
<xml_diff>
--- a/scripts/helper_files/Risk-Map-Slides-Template.pptx
+++ b/scripts/helper_files/Risk-Map-Slides-Template.pptx
@@ -212,7 +212,7 @@
           <a:p>
             <a:fld id="{E1EDD65B-155A-4086-A4C4-B35FD5C437C7}" type="datetimeFigureOut">
               <a:rPr lang="en-US" smtClean="0"/>
-              <a:t>12/24/2020</a:t>
+              <a:t>1/4/2021</a:t>
             </a:fld>
             <a:endParaRPr lang="en-US"/>
           </a:p>
@@ -389,7 +389,7 @@
           <a:p>
             <a:fld id="{C4D982AD-0C69-4591-8A56-66EED68B8D5B}" type="datetimeFigureOut">
               <a:rPr lang="en-US" smtClean="0"/>
-              <a:t>12/24/2020</a:t>
+              <a:t>1/4/2021</a:t>
             </a:fld>
             <a:endParaRPr lang="en-US"/>
           </a:p>
@@ -898,7 +898,7 @@
             <a:fld id="{EA116FA8-12ED-4DB7-9E1C-8D8E5107CE88}" type="datetime8">
               <a:rPr lang="en-US" smtClean="0"/>
               <a:pPr/>
-              <a:t>12/24/2020 10:58 AM</a:t>
+              <a:t>1/4/2021 2:16 PM</a:t>
             </a:fld>
             <a:endParaRPr lang="en-US" dirty="0"/>
           </a:p>
@@ -1140,7 +1140,7 @@
             <a:fld id="{EA116FA8-12ED-4DB7-9E1C-8D8E5107CE88}" type="datetime8">
               <a:rPr lang="en-US" smtClean="0"/>
               <a:pPr/>
-              <a:t>12/24/2020 10:58 AM</a:t>
+              <a:t>1/4/2021 2:16 PM</a:t>
             </a:fld>
             <a:endParaRPr lang="en-US" dirty="0"/>
           </a:p>
@@ -1392,7 +1392,7 @@
             <a:fld id="{EA116FA8-12ED-4DB7-9E1C-8D8E5107CE88}" type="datetime8">
               <a:rPr lang="en-US" smtClean="0"/>
               <a:pPr/>
-              <a:t>12/24/2020 10:58 AM</a:t>
+              <a:t>1/4/2021 2:16 PM</a:t>
             </a:fld>
             <a:endParaRPr lang="en-US" dirty="0"/>
           </a:p>
@@ -1634,7 +1634,7 @@
             <a:fld id="{EA116FA8-12ED-4DB7-9E1C-8D8E5107CE88}" type="datetime8">
               <a:rPr lang="en-US" smtClean="0"/>
               <a:pPr/>
-              <a:t>12/24/2020 10:58 AM</a:t>
+              <a:t>1/4/2021 2:16 PM</a:t>
             </a:fld>
             <a:endParaRPr lang="en-US" dirty="0"/>
           </a:p>
@@ -1953,7 +1953,7 @@
             <a:fld id="{EA116FA8-12ED-4DB7-9E1C-8D8E5107CE88}" type="datetime8">
               <a:rPr lang="en-US" smtClean="0"/>
               <a:pPr/>
-              <a:t>12/24/2020 10:58 AM</a:t>
+              <a:t>1/4/2021 2:16 PM</a:t>
             </a:fld>
             <a:endParaRPr lang="en-US" dirty="0"/>
           </a:p>
@@ -2262,7 +2262,7 @@
             <a:fld id="{EA116FA8-12ED-4DB7-9E1C-8D8E5107CE88}" type="datetime8">
               <a:rPr lang="en-US" smtClean="0"/>
               <a:pPr/>
-              <a:t>12/24/2020 10:58 AM</a:t>
+              <a:t>1/4/2021 2:16 PM</a:t>
             </a:fld>
             <a:endParaRPr lang="en-US" dirty="0"/>
           </a:p>
@@ -2718,7 +2718,7 @@
             <a:fld id="{EA116FA8-12ED-4DB7-9E1C-8D8E5107CE88}" type="datetime8">
               <a:rPr lang="en-US" smtClean="0"/>
               <a:pPr/>
-              <a:t>12/24/2020 10:58 AM</a:t>
+              <a:t>1/4/2021 2:16 PM</a:t>
             </a:fld>
             <a:endParaRPr lang="en-US" dirty="0"/>
           </a:p>
@@ -2903,7 +2903,7 @@
             <a:fld id="{EA116FA8-12ED-4DB7-9E1C-8D8E5107CE88}" type="datetime8">
               <a:rPr lang="en-US" smtClean="0"/>
               <a:pPr/>
-              <a:t>12/24/2020 10:58 AM</a:t>
+              <a:t>1/4/2021 2:16 PM</a:t>
             </a:fld>
             <a:endParaRPr lang="en-US" dirty="0"/>
           </a:p>
@@ -3060,7 +3060,7 @@
             <a:fld id="{EA116FA8-12ED-4DB7-9E1C-8D8E5107CE88}" type="datetime8">
               <a:rPr lang="en-US" smtClean="0"/>
               <a:pPr/>
-              <a:t>12/24/2020 10:58 AM</a:t>
+              <a:t>1/4/2021 2:16 PM</a:t>
             </a:fld>
             <a:endParaRPr lang="en-US" dirty="0"/>
           </a:p>
@@ -3362,7 +3362,7 @@
             <a:fld id="{EA116FA8-12ED-4DB7-9E1C-8D8E5107CE88}" type="datetime8">
               <a:rPr lang="en-US" smtClean="0"/>
               <a:pPr/>
-              <a:t>12/24/2020 10:58 AM</a:t>
+              <a:t>1/4/2021 2:16 PM</a:t>
             </a:fld>
             <a:endParaRPr lang="en-US" dirty="0"/>
           </a:p>
@@ -3610,7 +3610,7 @@
             <a:fld id="{EA116FA8-12ED-4DB7-9E1C-8D8E5107CE88}" type="datetime8">
               <a:rPr lang="en-US" smtClean="0"/>
               <a:pPr/>
-              <a:t>12/24/2020 10:58 AM</a:t>
+              <a:t>1/4/2021 2:16 PM</a:t>
             </a:fld>
             <a:endParaRPr lang="en-US" dirty="0"/>
           </a:p>
@@ -3968,8 +3968,8 @@
         </p:blipFill>
         <p:spPr>
           <a:xfrm>
-            <a:off x="7487139" y="6197759"/>
-            <a:ext cx="548640" cy="548640"/>
+            <a:off x="7576793" y="6287413"/>
+            <a:ext cx="369332" cy="369332"/>
           </a:xfrm>
           <a:prstGeom prst="rect">
             <a:avLst/>

</xml_diff>